<commit_message>
Code und Assets zum Kopieren hinzugefügt.
</commit_message>
<xml_diff>
--- a/src/Sonstiges.pptx
+++ b/src/Sonstiges.pptx
@@ -282,7 +282,7 @@
           <a:p>
             <a:fld id="{7F74B683-5B55-47E9-B45C-EB67E1285507}" type="datetimeFigureOut">
               <a:rPr lang="de-DE" smtClean="0"/>
-              <a:t>17.03.2025</a:t>
+              <a:t>19.03.2025</a:t>
             </a:fld>
             <a:endParaRPr lang="de-DE"/>
           </a:p>
@@ -452,7 +452,7 @@
           <a:p>
             <a:fld id="{7F74B683-5B55-47E9-B45C-EB67E1285507}" type="datetimeFigureOut">
               <a:rPr lang="de-DE" smtClean="0"/>
-              <a:t>17.03.2025</a:t>
+              <a:t>19.03.2025</a:t>
             </a:fld>
             <a:endParaRPr lang="de-DE"/>
           </a:p>
@@ -632,7 +632,7 @@
           <a:p>
             <a:fld id="{7F74B683-5B55-47E9-B45C-EB67E1285507}" type="datetimeFigureOut">
               <a:rPr lang="de-DE" smtClean="0"/>
-              <a:t>17.03.2025</a:t>
+              <a:t>19.03.2025</a:t>
             </a:fld>
             <a:endParaRPr lang="de-DE"/>
           </a:p>
@@ -802,7 +802,7 @@
           <a:p>
             <a:fld id="{7F74B683-5B55-47E9-B45C-EB67E1285507}" type="datetimeFigureOut">
               <a:rPr lang="de-DE" smtClean="0"/>
-              <a:t>17.03.2025</a:t>
+              <a:t>19.03.2025</a:t>
             </a:fld>
             <a:endParaRPr lang="de-DE"/>
           </a:p>
@@ -1048,7 +1048,7 @@
           <a:p>
             <a:fld id="{7F74B683-5B55-47E9-B45C-EB67E1285507}" type="datetimeFigureOut">
               <a:rPr lang="de-DE" smtClean="0"/>
-              <a:t>17.03.2025</a:t>
+              <a:t>19.03.2025</a:t>
             </a:fld>
             <a:endParaRPr lang="de-DE"/>
           </a:p>
@@ -1280,7 +1280,7 @@
           <a:p>
             <a:fld id="{7F74B683-5B55-47E9-B45C-EB67E1285507}" type="datetimeFigureOut">
               <a:rPr lang="de-DE" smtClean="0"/>
-              <a:t>17.03.2025</a:t>
+              <a:t>19.03.2025</a:t>
             </a:fld>
             <a:endParaRPr lang="de-DE"/>
           </a:p>
@@ -1647,7 +1647,7 @@
           <a:p>
             <a:fld id="{7F74B683-5B55-47E9-B45C-EB67E1285507}" type="datetimeFigureOut">
               <a:rPr lang="de-DE" smtClean="0"/>
-              <a:t>17.03.2025</a:t>
+              <a:t>19.03.2025</a:t>
             </a:fld>
             <a:endParaRPr lang="de-DE"/>
           </a:p>
@@ -1765,7 +1765,7 @@
           <a:p>
             <a:fld id="{7F74B683-5B55-47E9-B45C-EB67E1285507}" type="datetimeFigureOut">
               <a:rPr lang="de-DE" smtClean="0"/>
-              <a:t>17.03.2025</a:t>
+              <a:t>19.03.2025</a:t>
             </a:fld>
             <a:endParaRPr lang="de-DE"/>
           </a:p>
@@ -1860,7 +1860,7 @@
           <a:p>
             <a:fld id="{7F74B683-5B55-47E9-B45C-EB67E1285507}" type="datetimeFigureOut">
               <a:rPr lang="de-DE" smtClean="0"/>
-              <a:t>17.03.2025</a:t>
+              <a:t>19.03.2025</a:t>
             </a:fld>
             <a:endParaRPr lang="de-DE"/>
           </a:p>
@@ -2137,7 +2137,7 @@
           <a:p>
             <a:fld id="{7F74B683-5B55-47E9-B45C-EB67E1285507}" type="datetimeFigureOut">
               <a:rPr lang="de-DE" smtClean="0"/>
-              <a:t>17.03.2025</a:t>
+              <a:t>19.03.2025</a:t>
             </a:fld>
             <a:endParaRPr lang="de-DE"/>
           </a:p>
@@ -2394,7 +2394,7 @@
           <a:p>
             <a:fld id="{7F74B683-5B55-47E9-B45C-EB67E1285507}" type="datetimeFigureOut">
               <a:rPr lang="de-DE" smtClean="0"/>
-              <a:t>17.03.2025</a:t>
+              <a:t>19.03.2025</a:t>
             </a:fld>
             <a:endParaRPr lang="de-DE"/>
           </a:p>
@@ -2607,7 +2607,7 @@
           <a:p>
             <a:fld id="{7F74B683-5B55-47E9-B45C-EB67E1285507}" type="datetimeFigureOut">
               <a:rPr lang="de-DE" smtClean="0"/>
-              <a:t>17.03.2025</a:t>
+              <a:t>19.03.2025</a:t>
             </a:fld>
             <a:endParaRPr lang="de-DE"/>
           </a:p>
@@ -3095,6 +3095,11 @@
               <a:rPr lang="de-DE" dirty="0"/>
               <a:t>Melde dich bitte bei allen Schwierigkeiten.</a:t>
             </a:r>
+          </a:p>
+          <a:p>
+            <a:pPr marL="0" indent="0">
+              <a:buNone/>
+            </a:pPr>
             <a:endParaRPr lang="de-DE" dirty="0">
               <a:solidFill>
                 <a:srgbClr val="FFFFFF"/>
@@ -3103,6 +3108,55 @@
               <a:ea typeface="Calibri" panose="020F0502020204030204" pitchFamily="34" charset="0"/>
               <a:cs typeface="Calibri" panose="020F0502020204030204" pitchFamily="34" charset="0"/>
             </a:endParaRPr>
+          </a:p>
+          <a:p>
+            <a:pPr marL="0" indent="0">
+              <a:buNone/>
+            </a:pPr>
+            <a:r>
+              <a:rPr lang="de-DE" u="sng" dirty="0">
+                <a:solidFill>
+                  <a:srgbClr val="FFFFFF"/>
+                </a:solidFill>
+                <a:latin typeface="Calibri" panose="020F0502020204030204" pitchFamily="34" charset="0"/>
+                <a:ea typeface="Calibri" panose="020F0502020204030204" pitchFamily="34" charset="0"/>
+                <a:cs typeface="Calibri" panose="020F0502020204030204" pitchFamily="34" charset="0"/>
+              </a:rPr>
+              <a:t>Wichtig</a:t>
+            </a:r>
+            <a:r>
+              <a:rPr lang="de-DE" dirty="0">
+                <a:solidFill>
+                  <a:srgbClr val="FFFFFF"/>
+                </a:solidFill>
+                <a:latin typeface="Calibri" panose="020F0502020204030204" pitchFamily="34" charset="0"/>
+                <a:ea typeface="Calibri" panose="020F0502020204030204" pitchFamily="34" charset="0"/>
+                <a:cs typeface="Calibri" panose="020F0502020204030204" pitchFamily="34" charset="0"/>
+              </a:rPr>
+              <a:t>: Alle Klassennamen richtig und in </a:t>
+            </a:r>
+            <a:r>
+              <a:rPr lang="de-DE" dirty="0" err="1">
+                <a:solidFill>
+                  <a:srgbClr val="FFFFFF"/>
+                </a:solidFill>
+                <a:latin typeface="Calibri" panose="020F0502020204030204" pitchFamily="34" charset="0"/>
+                <a:ea typeface="Calibri" panose="020F0502020204030204" pitchFamily="34" charset="0"/>
+                <a:cs typeface="Calibri" panose="020F0502020204030204" pitchFamily="34" charset="0"/>
+              </a:rPr>
+              <a:t>UpperCamelCase</a:t>
+            </a:r>
+            <a:r>
+              <a:rPr lang="de-DE" dirty="0">
+                <a:solidFill>
+                  <a:srgbClr val="FFFFFF"/>
+                </a:solidFill>
+                <a:latin typeface="Calibri" panose="020F0502020204030204" pitchFamily="34" charset="0"/>
+                <a:ea typeface="Calibri" panose="020F0502020204030204" pitchFamily="34" charset="0"/>
+                <a:cs typeface="Calibri" panose="020F0502020204030204" pitchFamily="34" charset="0"/>
+              </a:rPr>
+              <a:t> schreiben.</a:t>
+            </a:r>
           </a:p>
         </p:txBody>
       </p:sp>
@@ -9124,7 +9178,7 @@
         <p:spPr>
           <a:xfrm>
             <a:off x="609600" y="335845"/>
-            <a:ext cx="10972800" cy="5909310"/>
+            <a:ext cx="10972800" cy="4801314"/>
           </a:xfrm>
           <a:prstGeom prst="rect">
             <a:avLst/>
@@ -9137,21 +9191,13 @@
           </a:bodyPr>
           <a:lstStyle/>
           <a:p>
-            <a:pPr marL="0" marR="0" lvl="0" indent="0" algn="l" defTabSz="914400" rtl="0" eaLnBrk="0" fontAlgn="base" latinLnBrk="0" hangingPunct="0">
-              <a:lnSpc>
-                <a:spcPct val="100000"/>
-              </a:lnSpc>
+            <a:pPr defTabSz="914400" eaLnBrk="0" fontAlgn="base" hangingPunct="0">
               <a:spcBef>
                 <a:spcPct val="0"/>
               </a:spcBef>
               <a:spcAft>
                 <a:spcPct val="0"/>
               </a:spcAft>
-              <a:buClrTx/>
-              <a:buSzTx/>
-              <a:buFontTx/>
-              <a:buNone/>
-              <a:tabLst/>
             </a:pPr>
             <a:r>
               <a:rPr kumimoji="0" lang="de-DE" altLang="de-DE" sz="1800" b="0" i="0" u="none" strike="noStrike" cap="none" normalizeH="0" baseline="0" dirty="0" err="1">
@@ -10307,68 +10353,262 @@
               <a:t>= </a:t>
             </a:r>
             <a:r>
+              <a:rPr kumimoji="0" lang="de-DE" altLang="de-DE" sz="1800" b="0" i="0" u="none" strike="noStrike" cap="none" normalizeH="0" baseline="0" dirty="0">
+                <a:ln>
+                  <a:noFill/>
+                </a:ln>
+                <a:solidFill>
+                  <a:srgbClr val="7030A0"/>
+                </a:solidFill>
+                <a:effectLst/>
+                <a:latin typeface="Consolas" panose="020B0609020204030204" pitchFamily="49" charset="0"/>
+              </a:rPr>
+              <a:t>??? (Format: </a:t>
+            </a:r>
+            <a:r>
               <a:rPr kumimoji="0" lang="de-DE" altLang="de-DE" sz="1800" b="0" i="0" u="none" strike="noStrike" cap="none" normalizeH="0" baseline="0" dirty="0" err="1">
                 <a:ln>
                   <a:noFill/>
                 </a:ln>
                 <a:solidFill>
+                  <a:srgbClr val="7030A0"/>
+                </a:solidFill>
+                <a:effectLst/>
+                <a:latin typeface="Consolas" panose="020B0609020204030204" pitchFamily="49" charset="0"/>
+              </a:rPr>
+              <a:t>dot</a:t>
+            </a:r>
+            <a:r>
+              <a:rPr kumimoji="0" lang="de-DE" altLang="de-DE" sz="1800" b="0" i="0" u="none" strike="noStrike" cap="none" normalizeH="0" baseline="0" dirty="0">
+                <a:ln>
+                  <a:noFill/>
+                </a:ln>
+                <a:solidFill>
+                  <a:srgbClr val="7030A0"/>
+                </a:solidFill>
+                <a:effectLst/>
+                <a:latin typeface="Consolas" panose="020B0609020204030204" pitchFamily="49" charset="0"/>
+              </a:rPr>
+              <a:t>&lt;Absolute Punktanzahl&gt;.</a:t>
+            </a:r>
+            <a:r>
+              <a:rPr kumimoji="0" lang="de-DE" altLang="de-DE" sz="1800" b="0" i="0" u="none" strike="noStrike" cap="none" normalizeH="0" baseline="0" dirty="0" err="1">
+                <a:ln>
+                  <a:noFill/>
+                </a:ln>
+                <a:solidFill>
+                  <a:srgbClr val="7030A0"/>
+                </a:solidFill>
+                <a:effectLst/>
+                <a:latin typeface="Consolas" panose="020B0609020204030204" pitchFamily="49" charset="0"/>
+              </a:rPr>
+              <a:t>png</a:t>
+            </a:r>
+            <a:r>
+              <a:rPr kumimoji="0" lang="de-DE" altLang="de-DE" sz="1800" b="0" i="0" u="none" strike="noStrike" cap="none" normalizeH="0" baseline="0" dirty="0">
+                <a:ln>
+                  <a:noFill/>
+                </a:ln>
+                <a:solidFill>
+                  <a:srgbClr val="7030A0"/>
+                </a:solidFill>
+                <a:effectLst/>
+                <a:latin typeface="Consolas" panose="020B0609020204030204" pitchFamily="49" charset="0"/>
+              </a:rPr>
+              <a:t>)</a:t>
+            </a:r>
+            <a:r>
+              <a:rPr kumimoji="0" lang="de-DE" altLang="de-DE" sz="1800" b="0" i="0" u="none" strike="noStrike" cap="none" normalizeH="0" baseline="0" dirty="0">
+                <a:ln>
+                  <a:noFill/>
+                </a:ln>
+                <a:solidFill>
+                  <a:srgbClr val="CC7E47"/>
+                </a:solidFill>
+                <a:effectLst/>
+                <a:latin typeface="Consolas" panose="020B0609020204030204" pitchFamily="49" charset="0"/>
+              </a:rPr>
+              <a:t>;</a:t>
+            </a:r>
+            <a:br>
+              <a:rPr kumimoji="0" lang="de-DE" altLang="de-DE" sz="1800" b="0" i="0" u="none" strike="noStrike" cap="none" normalizeH="0" baseline="0" dirty="0">
+                <a:ln>
+                  <a:noFill/>
+                </a:ln>
+                <a:solidFill>
+                  <a:srgbClr val="CC7E47"/>
+                </a:solidFill>
+                <a:effectLst/>
+                <a:latin typeface="Consolas" panose="020B0609020204030204" pitchFamily="49" charset="0"/>
+              </a:rPr>
+            </a:br>
+            <a:r>
+              <a:rPr kumimoji="0" lang="de-DE" altLang="de-DE" sz="1800" b="0" i="0" u="none" strike="noStrike" cap="none" normalizeH="0" baseline="0" dirty="0">
+                <a:ln>
+                  <a:noFill/>
+                </a:ln>
+                <a:solidFill>
+                  <a:srgbClr val="CC7E47"/>
+                </a:solidFill>
+                <a:effectLst/>
+                <a:latin typeface="Consolas" panose="020B0609020204030204" pitchFamily="49" charset="0"/>
+              </a:rPr>
+              <a:t>        </a:t>
+            </a:r>
+            <a:r>
+              <a:rPr kumimoji="0" lang="de-DE" altLang="de-DE" sz="1800" b="0" i="0" u="none" strike="noStrike" cap="none" normalizeH="0" baseline="0" dirty="0">
+                <a:ln>
+                  <a:noFill/>
+                </a:ln>
+                <a:solidFill>
+                  <a:srgbClr val="7030A0"/>
+                </a:solidFill>
+                <a:effectLst/>
+                <a:latin typeface="Consolas" panose="020B0609020204030204" pitchFamily="49" charset="0"/>
+              </a:rPr>
+              <a:t>??? (initialisiere </a:t>
+            </a:r>
+            <a:r>
+              <a:rPr kumimoji="0" lang="de-DE" altLang="de-DE" sz="1800" b="0" i="0" u="none" strike="noStrike" cap="none" normalizeH="0" baseline="0" dirty="0" err="1">
+                <a:ln>
+                  <a:noFill/>
+                </a:ln>
+                <a:solidFill>
+                  <a:srgbClr val="CC7E47"/>
+                </a:solidFill>
+                <a:effectLst/>
+                <a:latin typeface="Consolas" panose="020B0609020204030204" pitchFamily="49" charset="0"/>
+              </a:rPr>
+              <a:t>this</a:t>
+            </a:r>
+            <a:r>
+              <a:rPr kumimoji="0" lang="de-DE" altLang="de-DE" sz="1800" b="0" i="0" u="none" strike="noStrike" cap="none" normalizeH="0" baseline="0" dirty="0" err="1">
+                <a:ln>
+                  <a:noFill/>
+                </a:ln>
+                <a:solidFill>
+                  <a:srgbClr val="AC91E3"/>
+                </a:solidFill>
+                <a:effectLst/>
+                <a:latin typeface="Consolas" panose="020B0609020204030204" pitchFamily="49" charset="0"/>
+              </a:rPr>
+              <a:t>.</a:t>
+            </a:r>
+            <a:r>
+              <a:rPr kumimoji="0" lang="de-DE" altLang="de-DE" sz="1800" b="0" i="0" u="none" strike="noStrike" cap="none" normalizeH="0" baseline="0" dirty="0" err="1">
+                <a:ln>
+                  <a:noFill/>
+                </a:ln>
+                <a:solidFill>
+                  <a:srgbClr val="9876AA"/>
+                </a:solidFill>
+                <a:effectLst/>
+                <a:latin typeface="Consolas" panose="020B0609020204030204" pitchFamily="49" charset="0"/>
+              </a:rPr>
+              <a:t>points</a:t>
+            </a:r>
+            <a:r>
+              <a:rPr kumimoji="0" lang="de-DE" altLang="de-DE" sz="1800" b="0" i="0" u="none" strike="noStrike" cap="none" normalizeH="0" baseline="0" dirty="0">
+                <a:ln>
+                  <a:noFill/>
+                </a:ln>
+                <a:solidFill>
+                  <a:srgbClr val="7030A0"/>
+                </a:solidFill>
+                <a:effectLst/>
+                <a:latin typeface="Consolas" panose="020B0609020204030204" pitchFamily="49" charset="0"/>
+              </a:rPr>
+              <a:t>)</a:t>
+            </a:r>
+            <a:br>
+              <a:rPr kumimoji="0" lang="de-DE" altLang="de-DE" sz="1800" b="0" i="0" u="none" strike="noStrike" cap="none" normalizeH="0" baseline="0" dirty="0">
+                <a:ln>
+                  <a:noFill/>
+                </a:ln>
+                <a:solidFill>
+                  <a:srgbClr val="CC7E47"/>
+                </a:solidFill>
+                <a:effectLst/>
+                <a:latin typeface="Consolas" panose="020B0609020204030204" pitchFamily="49" charset="0"/>
+              </a:rPr>
+            </a:br>
+            <a:r>
+              <a:rPr kumimoji="0" lang="de-DE" altLang="de-DE" sz="1800" b="0" i="0" u="none" strike="noStrike" cap="none" normalizeH="0" baseline="0" dirty="0">
+                <a:ln>
+                  <a:noFill/>
+                </a:ln>
+                <a:solidFill>
+                  <a:srgbClr val="CC7E47"/>
+                </a:solidFill>
+                <a:effectLst/>
+                <a:latin typeface="Consolas" panose="020B0609020204030204" pitchFamily="49" charset="0"/>
+              </a:rPr>
+              <a:t>        </a:t>
+            </a:r>
+            <a:r>
+              <a:rPr kumimoji="0" lang="de-DE" altLang="de-DE" sz="1800" b="0" i="0" u="none" strike="noStrike" cap="none" normalizeH="0" baseline="0" dirty="0" err="1">
+                <a:ln>
+                  <a:noFill/>
+                </a:ln>
+                <a:solidFill>
+                  <a:srgbClr val="CC7E47"/>
+                </a:solidFill>
+                <a:effectLst/>
+                <a:latin typeface="Consolas" panose="020B0609020204030204" pitchFamily="49" charset="0"/>
+              </a:rPr>
+              <a:t>this</a:t>
+            </a:r>
+            <a:r>
+              <a:rPr kumimoji="0" lang="de-DE" altLang="de-DE" sz="1800" b="0" i="0" u="none" strike="noStrike" cap="none" normalizeH="0" baseline="0" dirty="0" err="1">
+                <a:ln>
+                  <a:noFill/>
+                </a:ln>
+                <a:solidFill>
+                  <a:srgbClr val="AC91E3"/>
+                </a:solidFill>
+                <a:effectLst/>
+                <a:latin typeface="Consolas" panose="020B0609020204030204" pitchFamily="49" charset="0"/>
+              </a:rPr>
+              <a:t>.</a:t>
+            </a:r>
+            <a:r>
+              <a:rPr kumimoji="0" lang="de-DE" altLang="de-DE" sz="1800" b="0" i="0" u="none" strike="noStrike" cap="none" normalizeH="0" baseline="0" dirty="0" err="1">
+                <a:ln>
+                  <a:noFill/>
+                </a:ln>
+                <a:solidFill>
+                  <a:srgbClr val="9876AA"/>
+                </a:solidFill>
+                <a:effectLst/>
+                <a:latin typeface="Consolas" panose="020B0609020204030204" pitchFamily="49" charset="0"/>
+              </a:rPr>
+              <a:t>color</a:t>
+            </a:r>
+            <a:r>
+              <a:rPr kumimoji="0" lang="de-DE" altLang="de-DE" sz="1800" b="0" i="0" u="none" strike="noStrike" cap="none" normalizeH="0" baseline="0" dirty="0">
+                <a:ln>
+                  <a:noFill/>
+                </a:ln>
+                <a:solidFill>
+                  <a:srgbClr val="9876AA"/>
+                </a:solidFill>
+                <a:effectLst/>
+                <a:latin typeface="Consolas" panose="020B0609020204030204" pitchFamily="49" charset="0"/>
+              </a:rPr>
+              <a:t> </a:t>
+            </a:r>
+            <a:r>
+              <a:rPr kumimoji="0" lang="de-DE" altLang="de-DE" sz="1800" b="0" i="0" u="none" strike="noStrike" cap="none" normalizeH="0" baseline="0" dirty="0">
+                <a:ln>
+                  <a:noFill/>
+                </a:ln>
+                <a:solidFill>
                   <a:srgbClr val="A9B7C6"/>
                 </a:solidFill>
                 <a:effectLst/>
                 <a:latin typeface="Consolas" panose="020B0609020204030204" pitchFamily="49" charset="0"/>
               </a:rPr>
-              <a:t>textureName</a:t>
-            </a:r>
-            <a:r>
-              <a:rPr kumimoji="0" lang="de-DE" altLang="de-DE" sz="1800" b="0" i="0" u="none" strike="noStrike" cap="none" normalizeH="0" baseline="0" dirty="0">
-                <a:ln>
-                  <a:noFill/>
-                </a:ln>
-                <a:solidFill>
-                  <a:srgbClr val="CC7E47"/>
-                </a:solidFill>
-                <a:effectLst/>
-                <a:latin typeface="Consolas" panose="020B0609020204030204" pitchFamily="49" charset="0"/>
-              </a:rPr>
-              <a:t>;</a:t>
-            </a:r>
-            <a:br>
-              <a:rPr kumimoji="0" lang="de-DE" altLang="de-DE" sz="1800" b="0" i="0" u="none" strike="noStrike" cap="none" normalizeH="0" baseline="0" dirty="0">
-                <a:ln>
-                  <a:noFill/>
-                </a:ln>
-                <a:solidFill>
-                  <a:srgbClr val="CC7E47"/>
-                </a:solidFill>
-                <a:effectLst/>
-                <a:latin typeface="Consolas" panose="020B0609020204030204" pitchFamily="49" charset="0"/>
-              </a:rPr>
-            </a:br>
-            <a:r>
-              <a:rPr kumimoji="0" lang="de-DE" altLang="de-DE" sz="1800" b="0" i="0" u="none" strike="noStrike" cap="none" normalizeH="0" baseline="0" dirty="0">
-                <a:ln>
-                  <a:noFill/>
-                </a:ln>
-                <a:solidFill>
-                  <a:srgbClr val="CC7E47"/>
-                </a:solidFill>
-                <a:effectLst/>
-                <a:latin typeface="Consolas" panose="020B0609020204030204" pitchFamily="49" charset="0"/>
-              </a:rPr>
-              <a:t>        </a:t>
-            </a:r>
-            <a:r>
-              <a:rPr kumimoji="0" lang="de-DE" altLang="de-DE" sz="1800" b="0" i="0" u="none" strike="noStrike" cap="none" normalizeH="0" baseline="0" dirty="0">
-                <a:ln>
-                  <a:noFill/>
-                </a:ln>
-                <a:solidFill>
-                  <a:srgbClr val="7030A0"/>
-                </a:solidFill>
-                <a:effectLst/>
-                <a:latin typeface="Consolas" panose="020B0609020204030204" pitchFamily="49" charset="0"/>
-              </a:rPr>
-              <a:t>??? (initialisiere </a:t>
+              <a:t>= </a:t>
             </a:r>
             <a:r>
               <a:rPr kumimoji="0" lang="de-DE" altLang="de-DE" sz="1800" b="0" i="0" u="none" strike="noStrike" cap="none" normalizeH="0" baseline="0" dirty="0" err="1">
@@ -10376,12 +10616,51 @@
                   <a:noFill/>
                 </a:ln>
                 <a:solidFill>
-                  <a:srgbClr val="CC7E47"/>
-                </a:solidFill>
-                <a:effectLst/>
-                <a:latin typeface="Consolas" panose="020B0609020204030204" pitchFamily="49" charset="0"/>
-              </a:rPr>
-              <a:t>this</a:t>
+                  <a:srgbClr val="A9B7C6"/>
+                </a:solidFill>
+                <a:effectLst/>
+                <a:latin typeface="Consolas" panose="020B0609020204030204" pitchFamily="49" charset="0"/>
+              </a:rPr>
+              <a:t>points</a:t>
+            </a:r>
+            <a:r>
+              <a:rPr kumimoji="0" lang="de-DE" altLang="de-DE" sz="1800" b="0" i="0" u="none" strike="noStrike" cap="none" normalizeH="0" baseline="0" dirty="0">
+                <a:ln>
+                  <a:noFill/>
+                </a:ln>
+                <a:solidFill>
+                  <a:srgbClr val="A9B7C6"/>
+                </a:solidFill>
+                <a:effectLst/>
+                <a:latin typeface="Consolas" panose="020B0609020204030204" pitchFamily="49" charset="0"/>
+              </a:rPr>
+              <a:t> &lt; </a:t>
+            </a:r>
+            <a:r>
+              <a:rPr kumimoji="0" lang="de-DE" altLang="de-DE" sz="1800" b="0" i="0" u="none" strike="noStrike" cap="none" normalizeH="0" baseline="0" dirty="0">
+                <a:ln>
+                  <a:noFill/>
+                </a:ln>
+                <a:solidFill>
+                  <a:srgbClr val="6897BB"/>
+                </a:solidFill>
+                <a:effectLst/>
+                <a:latin typeface="Consolas" panose="020B0609020204030204" pitchFamily="49" charset="0"/>
+              </a:rPr>
+              <a:t>0 </a:t>
+            </a:r>
+            <a:r>
+              <a:rPr kumimoji="0" lang="de-DE" altLang="de-DE" sz="1800" b="0" i="0" u="none" strike="noStrike" cap="none" normalizeH="0" baseline="0" dirty="0">
+                <a:ln>
+                  <a:noFill/>
+                </a:ln>
+                <a:solidFill>
+                  <a:srgbClr val="A9B7C6"/>
+                </a:solidFill>
+                <a:effectLst/>
+                <a:latin typeface="Consolas" panose="020B0609020204030204" pitchFamily="49" charset="0"/>
+              </a:rPr>
+              <a:t>? </a:t>
             </a:r>
             <a:r>
               <a:rPr kumimoji="0" lang="de-DE" altLang="de-DE" sz="1800" b="0" i="0" u="none" strike="noStrike" cap="none" normalizeH="0" baseline="0" dirty="0" err="1">
@@ -10389,15 +10668,28 @@
                   <a:noFill/>
                 </a:ln>
                 <a:solidFill>
+                  <a:srgbClr val="5FB1DA"/>
+                </a:solidFill>
+                <a:effectLst/>
+                <a:latin typeface="JetBrains Mono"/>
+              </a:rPr>
+              <a:t>Colors</a:t>
+            </a:r>
+            <a:r>
+              <a:rPr kumimoji="0" lang="de-DE" altLang="de-DE" sz="1800" b="0" i="0" u="none" strike="noStrike" cap="none" normalizeH="0" baseline="0" dirty="0" err="1">
+                <a:ln>
+                  <a:noFill/>
+                </a:ln>
+                <a:solidFill>
                   <a:srgbClr val="AC91E3"/>
                 </a:solidFill>
                 <a:effectLst/>
-                <a:latin typeface="Consolas" panose="020B0609020204030204" pitchFamily="49" charset="0"/>
+                <a:latin typeface="JetBrains Mono"/>
               </a:rPr>
               <a:t>.</a:t>
             </a:r>
             <a:r>
-              <a:rPr kumimoji="0" lang="de-DE" altLang="de-DE" sz="1800" b="0" i="0" u="none" strike="noStrike" cap="none" normalizeH="0" baseline="0" dirty="0" err="1">
+              <a:rPr kumimoji="0" lang="de-DE" altLang="de-DE" sz="1800" b="0" i="1" u="none" strike="noStrike" cap="none" normalizeH="0" baseline="0" dirty="0" err="1">
                 <a:ln>
                   <a:noFill/>
                 </a:ln>
@@ -10405,177 +10697,22 @@
                   <a:srgbClr val="9876AA"/>
                 </a:solidFill>
                 <a:effectLst/>
-                <a:latin typeface="Consolas" panose="020B0609020204030204" pitchFamily="49" charset="0"/>
-              </a:rPr>
-              <a:t>points</a:t>
-            </a:r>
-            <a:r>
-              <a:rPr kumimoji="0" lang="de-DE" altLang="de-DE" sz="1800" b="0" i="0" u="none" strike="noStrike" cap="none" normalizeH="0" baseline="0" dirty="0">
-                <a:ln>
-                  <a:noFill/>
-                </a:ln>
-                <a:solidFill>
-                  <a:srgbClr val="7030A0"/>
-                </a:solidFill>
-                <a:effectLst/>
-                <a:latin typeface="Consolas" panose="020B0609020204030204" pitchFamily="49" charset="0"/>
-              </a:rPr>
-              <a:t>)</a:t>
-            </a:r>
-            <a:br>
-              <a:rPr kumimoji="0" lang="de-DE" altLang="de-DE" sz="1800" b="0" i="0" u="none" strike="noStrike" cap="none" normalizeH="0" baseline="0" dirty="0">
-                <a:ln>
-                  <a:noFill/>
-                </a:ln>
-                <a:solidFill>
-                  <a:srgbClr val="CC7E47"/>
-                </a:solidFill>
-                <a:effectLst/>
-                <a:latin typeface="Consolas" panose="020B0609020204030204" pitchFamily="49" charset="0"/>
-              </a:rPr>
-            </a:br>
-            <a:r>
-              <a:rPr kumimoji="0" lang="de-DE" altLang="de-DE" sz="1800" b="0" i="0" u="none" strike="noStrike" cap="none" normalizeH="0" baseline="0" dirty="0">
-                <a:ln>
-                  <a:noFill/>
-                </a:ln>
-                <a:solidFill>
-                  <a:srgbClr val="CC7E47"/>
-                </a:solidFill>
-                <a:effectLst/>
-                <a:latin typeface="Consolas" panose="020B0609020204030204" pitchFamily="49" charset="0"/>
-              </a:rPr>
-              <a:t>        </a:t>
-            </a:r>
-            <a:r>
-              <a:rPr kumimoji="0" lang="de-DE" altLang="de-DE" sz="1800" b="0" i="0" u="none" strike="noStrike" cap="none" normalizeH="0" baseline="0" dirty="0" err="1">
-                <a:ln>
-                  <a:noFill/>
-                </a:ln>
-                <a:solidFill>
-                  <a:srgbClr val="CC7E47"/>
-                </a:solidFill>
-                <a:effectLst/>
-                <a:latin typeface="Consolas" panose="020B0609020204030204" pitchFamily="49" charset="0"/>
-              </a:rPr>
-              <a:t>this</a:t>
-            </a:r>
-            <a:r>
-              <a:rPr kumimoji="0" lang="de-DE" altLang="de-DE" sz="1800" b="0" i="0" u="none" strike="noStrike" cap="none" normalizeH="0" baseline="0" dirty="0" err="1">
-                <a:ln>
-                  <a:noFill/>
-                </a:ln>
-                <a:solidFill>
-                  <a:srgbClr val="AC91E3"/>
-                </a:solidFill>
-                <a:effectLst/>
-                <a:latin typeface="Consolas" panose="020B0609020204030204" pitchFamily="49" charset="0"/>
-              </a:rPr>
-              <a:t>.</a:t>
-            </a:r>
-            <a:r>
-              <a:rPr kumimoji="0" lang="de-DE" altLang="de-DE" sz="1800" b="0" i="0" u="none" strike="noStrike" cap="none" normalizeH="0" baseline="0" dirty="0" err="1">
-                <a:ln>
-                  <a:noFill/>
-                </a:ln>
-                <a:solidFill>
-                  <a:srgbClr val="9876AA"/>
-                </a:solidFill>
-                <a:effectLst/>
-                <a:latin typeface="Consolas" panose="020B0609020204030204" pitchFamily="49" charset="0"/>
-              </a:rPr>
-              <a:t>color</a:t>
-            </a:r>
-            <a:r>
-              <a:rPr kumimoji="0" lang="de-DE" altLang="de-DE" sz="1800" b="0" i="0" u="none" strike="noStrike" cap="none" normalizeH="0" baseline="0" dirty="0">
-                <a:ln>
-                  <a:noFill/>
-                </a:ln>
-                <a:solidFill>
-                  <a:srgbClr val="9876AA"/>
+                <a:latin typeface="JetBrains Mono"/>
+              </a:rPr>
+              <a:t>NEGATIVE_COLOR</a:t>
+            </a:r>
+            <a:r>
+              <a:rPr kumimoji="0" lang="de-DE" altLang="de-DE" sz="1800" b="0" i="1" u="none" strike="noStrike" cap="none" normalizeH="0" baseline="0" dirty="0">
+                <a:ln>
+                  <a:noFill/>
+                </a:ln>
+                <a:solidFill>
+                  <a:srgbClr val="76AA77"/>
                 </a:solidFill>
                 <a:effectLst/>
                 <a:latin typeface="Consolas" panose="020B0609020204030204" pitchFamily="49" charset="0"/>
               </a:rPr>
               <a:t> </a:t>
-            </a:r>
-            <a:r>
-              <a:rPr kumimoji="0" lang="de-DE" altLang="de-DE" sz="1800" b="0" i="0" u="none" strike="noStrike" cap="none" normalizeH="0" baseline="0" dirty="0">
-                <a:ln>
-                  <a:noFill/>
-                </a:ln>
-                <a:solidFill>
-                  <a:srgbClr val="A9B7C6"/>
-                </a:solidFill>
-                <a:effectLst/>
-                <a:latin typeface="Consolas" panose="020B0609020204030204" pitchFamily="49" charset="0"/>
-              </a:rPr>
-              <a:t>= </a:t>
-            </a:r>
-            <a:r>
-              <a:rPr kumimoji="0" lang="de-DE" altLang="de-DE" sz="1800" b="0" i="0" u="none" strike="noStrike" cap="none" normalizeH="0" baseline="0" dirty="0" err="1">
-                <a:ln>
-                  <a:noFill/>
-                </a:ln>
-                <a:solidFill>
-                  <a:srgbClr val="A9B7C6"/>
-                </a:solidFill>
-                <a:effectLst/>
-                <a:latin typeface="Consolas" panose="020B0609020204030204" pitchFamily="49" charset="0"/>
-              </a:rPr>
-              <a:t>points</a:t>
-            </a:r>
-            <a:r>
-              <a:rPr kumimoji="0" lang="de-DE" altLang="de-DE" sz="1800" b="0" i="0" u="none" strike="noStrike" cap="none" normalizeH="0" baseline="0" dirty="0">
-                <a:ln>
-                  <a:noFill/>
-                </a:ln>
-                <a:solidFill>
-                  <a:srgbClr val="A9B7C6"/>
-                </a:solidFill>
-                <a:effectLst/>
-                <a:latin typeface="Consolas" panose="020B0609020204030204" pitchFamily="49" charset="0"/>
-              </a:rPr>
-              <a:t> &lt; </a:t>
-            </a:r>
-            <a:r>
-              <a:rPr kumimoji="0" lang="de-DE" altLang="de-DE" sz="1800" b="0" i="0" u="none" strike="noStrike" cap="none" normalizeH="0" baseline="0" dirty="0">
-                <a:ln>
-                  <a:noFill/>
-                </a:ln>
-                <a:solidFill>
-                  <a:srgbClr val="6897BB"/>
-                </a:solidFill>
-                <a:effectLst/>
-                <a:latin typeface="Consolas" panose="020B0609020204030204" pitchFamily="49" charset="0"/>
-              </a:rPr>
-              <a:t>0 </a:t>
-            </a:r>
-            <a:r>
-              <a:rPr kumimoji="0" lang="de-DE" altLang="de-DE" sz="1800" b="0" i="0" u="none" strike="noStrike" cap="none" normalizeH="0" baseline="0" dirty="0">
-                <a:ln>
-                  <a:noFill/>
-                </a:ln>
-                <a:solidFill>
-                  <a:srgbClr val="A9B7C6"/>
-                </a:solidFill>
-                <a:effectLst/>
-                <a:latin typeface="Consolas" panose="020B0609020204030204" pitchFamily="49" charset="0"/>
-              </a:rPr>
-              <a:t>? </a:t>
-            </a:r>
-            <a:r>
-              <a:rPr kumimoji="0" lang="de-DE" altLang="de-DE" sz="1800" b="0" i="1" u="none" strike="noStrike" cap="none" normalizeH="0" baseline="0" dirty="0">
-                <a:ln>
-                  <a:noFill/>
-                </a:ln>
-                <a:solidFill>
-                  <a:srgbClr val="76AA77"/>
-                </a:solidFill>
-                <a:effectLst/>
-                <a:latin typeface="Consolas" panose="020B0609020204030204" pitchFamily="49" charset="0"/>
-              </a:rPr>
-              <a:t>NEGATIVE_COLOR </a:t>
             </a:r>
             <a:r>
               <a:rPr kumimoji="0" lang="de-DE" altLang="de-DE" sz="1800" b="0" i="0" u="none" strike="noStrike" cap="none" normalizeH="0" baseline="0" dirty="0">
@@ -10698,7 +10835,7 @@
                   <a:noFill/>
                 </a:ln>
                 <a:solidFill>
-                  <a:srgbClr val="CC7E47"/>
+                  <a:srgbClr val="507874"/>
                 </a:solidFill>
                 <a:effectLst/>
                 <a:latin typeface="Consolas" panose="020B0609020204030204" pitchFamily="49" charset="0"/>
@@ -10710,7 +10847,7 @@
                   <a:noFill/>
                 </a:ln>
                 <a:solidFill>
-                  <a:srgbClr val="CC7E47"/>
+                  <a:srgbClr val="507874"/>
                 </a:solidFill>
                 <a:effectLst/>
                 <a:latin typeface="Consolas" panose="020B0609020204030204" pitchFamily="49" charset="0"/>
@@ -10718,43 +10855,43 @@
               <a:t>    </a:t>
             </a:r>
             <a:r>
+              <a:rPr kumimoji="0" lang="de-DE" altLang="de-DE" sz="1800" b="0" i="0" u="none" strike="noStrike" cap="none" normalizeH="0" baseline="0" dirty="0">
+                <a:ln>
+                  <a:noFill/>
+                </a:ln>
+                <a:solidFill>
+                  <a:srgbClr val="7030A0"/>
+                </a:solidFill>
+                <a:effectLst/>
+                <a:latin typeface="Consolas" panose="020B0609020204030204" pitchFamily="49" charset="0"/>
+              </a:rPr>
+              <a:t>??? (</a:t>
+            </a:r>
+            <a:r>
               <a:rPr kumimoji="0" lang="de-DE" altLang="de-DE" sz="1800" b="0" i="0" u="none" strike="noStrike" cap="none" normalizeH="0" baseline="0" dirty="0" err="1">
                 <a:ln>
                   <a:noFill/>
                 </a:ln>
                 <a:solidFill>
-                  <a:srgbClr val="CC7E47"/>
-                </a:solidFill>
-                <a:effectLst/>
-                <a:latin typeface="Consolas" panose="020B0609020204030204" pitchFamily="49" charset="0"/>
-              </a:rPr>
-              <a:t>public</a:t>
-            </a:r>
-            <a:r>
-              <a:rPr kumimoji="0" lang="de-DE" altLang="de-DE" sz="1800" b="0" i="0" u="none" strike="noStrike" cap="none" normalizeH="0" baseline="0" dirty="0">
-                <a:ln>
-                  <a:noFill/>
-                </a:ln>
-                <a:solidFill>
-                  <a:srgbClr val="CC7E47"/>
-                </a:solidFill>
-                <a:effectLst/>
-                <a:latin typeface="Consolas" panose="020B0609020204030204" pitchFamily="49" charset="0"/>
-              </a:rPr>
-              <a:t> </a:t>
-            </a:r>
-            <a:r>
-              <a:rPr kumimoji="0" lang="de-DE" altLang="de-DE" sz="1800" b="0" i="0" u="none" strike="noStrike" cap="none" normalizeH="0" baseline="0" dirty="0">
-                <a:ln>
-                  <a:noFill/>
-                </a:ln>
-                <a:solidFill>
-                  <a:srgbClr val="5FB1DA"/>
-                </a:solidFill>
-                <a:effectLst/>
-                <a:latin typeface="Consolas" panose="020B0609020204030204" pitchFamily="49" charset="0"/>
-              </a:rPr>
-              <a:t>String </a:t>
+                  <a:srgbClr val="7030A0"/>
+                </a:solidFill>
+                <a:effectLst/>
+                <a:latin typeface="Consolas" panose="020B0609020204030204" pitchFamily="49" charset="0"/>
+              </a:rPr>
+              <a:t>getter</a:t>
+            </a:r>
+            <a:r>
+              <a:rPr kumimoji="0" lang="de-DE" altLang="de-DE" sz="1800" b="0" i="0" u="none" strike="noStrike" cap="none" normalizeH="0" baseline="0" dirty="0">
+                <a:ln>
+                  <a:noFill/>
+                </a:ln>
+                <a:solidFill>
+                  <a:srgbClr val="7030A0"/>
+                </a:solidFill>
+                <a:effectLst/>
+                <a:latin typeface="Consolas" panose="020B0609020204030204" pitchFamily="49" charset="0"/>
+              </a:rPr>
+              <a:t> für </a:t>
             </a:r>
             <a:r>
               <a:rPr kumimoji="0" lang="de-DE" altLang="de-DE" sz="1800" b="0" i="0" u="none" strike="noStrike" cap="none" normalizeH="0" baseline="0" dirty="0" err="1">
@@ -10762,96 +10899,6 @@
                   <a:noFill/>
                 </a:ln>
                 <a:solidFill>
-                  <a:srgbClr val="D6AF72"/>
-                </a:solidFill>
-                <a:effectLst/>
-                <a:latin typeface="Consolas" panose="020B0609020204030204" pitchFamily="49" charset="0"/>
-              </a:rPr>
-              <a:t>getTextureName</a:t>
-            </a:r>
-            <a:r>
-              <a:rPr kumimoji="0" lang="de-DE" altLang="de-DE" sz="1800" b="0" i="0" u="none" strike="noStrike" cap="none" normalizeH="0" baseline="0" dirty="0">
-                <a:ln>
-                  <a:noFill/>
-                </a:ln>
-                <a:solidFill>
-                  <a:srgbClr val="B0BA8C"/>
-                </a:solidFill>
-                <a:effectLst/>
-                <a:latin typeface="Consolas" panose="020B0609020204030204" pitchFamily="49" charset="0"/>
-              </a:rPr>
-              <a:t>() </a:t>
-            </a:r>
-            <a:r>
-              <a:rPr kumimoji="0" lang="de-DE" altLang="de-DE" sz="1800" b="0" i="0" u="none" strike="noStrike" cap="none" normalizeH="0" baseline="0" dirty="0">
-                <a:ln>
-                  <a:noFill/>
-                </a:ln>
-                <a:solidFill>
-                  <a:srgbClr val="507874"/>
-                </a:solidFill>
-                <a:effectLst/>
-                <a:latin typeface="Consolas" panose="020B0609020204030204" pitchFamily="49" charset="0"/>
-              </a:rPr>
-              <a:t>{</a:t>
-            </a:r>
-            <a:br>
-              <a:rPr kumimoji="0" lang="de-DE" altLang="de-DE" sz="1800" b="0" i="0" u="none" strike="noStrike" cap="none" normalizeH="0" baseline="0" dirty="0">
-                <a:ln>
-                  <a:noFill/>
-                </a:ln>
-                <a:solidFill>
-                  <a:srgbClr val="507874"/>
-                </a:solidFill>
-                <a:effectLst/>
-                <a:latin typeface="Consolas" panose="020B0609020204030204" pitchFamily="49" charset="0"/>
-              </a:rPr>
-            </a:br>
-            <a:r>
-              <a:rPr kumimoji="0" lang="de-DE" altLang="de-DE" sz="1800" b="0" i="0" u="none" strike="noStrike" cap="none" normalizeH="0" baseline="0" dirty="0">
-                <a:ln>
-                  <a:noFill/>
-                </a:ln>
-                <a:solidFill>
-                  <a:srgbClr val="507874"/>
-                </a:solidFill>
-                <a:effectLst/>
-                <a:latin typeface="Consolas" panose="020B0609020204030204" pitchFamily="49" charset="0"/>
-              </a:rPr>
-              <a:t>        </a:t>
-            </a:r>
-            <a:r>
-              <a:rPr kumimoji="0" lang="de-DE" altLang="de-DE" sz="1800" b="0" i="0" u="none" strike="noStrike" cap="none" normalizeH="0" baseline="0" dirty="0" err="1">
-                <a:ln>
-                  <a:noFill/>
-                </a:ln>
-                <a:solidFill>
-                  <a:srgbClr val="CC7E47"/>
-                </a:solidFill>
-                <a:effectLst/>
-                <a:latin typeface="Consolas" panose="020B0609020204030204" pitchFamily="49" charset="0"/>
-              </a:rPr>
-              <a:t>return</a:t>
-            </a:r>
-            <a:r>
-              <a:rPr kumimoji="0" lang="de-DE" altLang="de-DE" sz="1800" b="0" i="0" u="none" strike="noStrike" cap="none" normalizeH="0" baseline="0" dirty="0">
-                <a:ln>
-                  <a:noFill/>
-                </a:ln>
-                <a:solidFill>
-                  <a:srgbClr val="CC7E47"/>
-                </a:solidFill>
-                <a:effectLst/>
-                <a:latin typeface="Consolas" panose="020B0609020204030204" pitchFamily="49" charset="0"/>
-              </a:rPr>
-              <a:t> </a:t>
-            </a:r>
-            <a:r>
-              <a:rPr kumimoji="0" lang="de-DE" altLang="de-DE" sz="1800" b="0" i="0" u="none" strike="noStrike" cap="none" normalizeH="0" baseline="0" dirty="0" err="1">
-                <a:ln>
-                  <a:noFill/>
-                </a:ln>
-                <a:solidFill>
                   <a:srgbClr val="9876AA"/>
                 </a:solidFill>
                 <a:effectLst/>
@@ -10865,191 +10912,12 @@
                   <a:noFill/>
                 </a:ln>
                 <a:solidFill>
-                  <a:srgbClr val="9876AA"/>
-                </a:solidFill>
-                <a:effectLst/>
-                <a:latin typeface="Consolas" panose="020B0609020204030204" pitchFamily="49" charset="0"/>
-              </a:rPr>
-              <a:t> </a:t>
-            </a:r>
-            <a:r>
-              <a:rPr kumimoji="0" lang="de-DE" altLang="de-DE" sz="1800" b="0" i="0" u="none" strike="noStrike" cap="none" normalizeH="0" baseline="0" dirty="0">
-                <a:ln>
-                  <a:noFill/>
-                </a:ln>
-                <a:solidFill>
-                  <a:srgbClr val="A9B7C6"/>
-                </a:solidFill>
-                <a:effectLst/>
-                <a:latin typeface="Consolas" panose="020B0609020204030204" pitchFamily="49" charset="0"/>
-              </a:rPr>
-              <a:t>+ </a:t>
-            </a:r>
-            <a:r>
-              <a:rPr kumimoji="0" lang="de-DE" altLang="de-DE" sz="1800" b="0" i="0" u="none" strike="noStrike" cap="none" normalizeH="0" baseline="0" dirty="0">
-                <a:ln>
-                  <a:noFill/>
-                </a:ln>
-                <a:solidFill>
-                  <a:srgbClr val="6A8759"/>
-                </a:solidFill>
-                <a:effectLst/>
-                <a:latin typeface="Consolas" panose="020B0609020204030204" pitchFamily="49" charset="0"/>
-              </a:rPr>
-              <a:t>".</a:t>
-            </a:r>
-            <a:r>
-              <a:rPr kumimoji="0" lang="de-DE" altLang="de-DE" sz="1800" b="0" i="0" u="none" strike="noStrike" cap="none" normalizeH="0" baseline="0" dirty="0" err="1">
-                <a:ln>
-                  <a:noFill/>
-                </a:ln>
-                <a:solidFill>
-                  <a:srgbClr val="6A8759"/>
-                </a:solidFill>
-                <a:effectLst/>
-                <a:latin typeface="Consolas" panose="020B0609020204030204" pitchFamily="49" charset="0"/>
-              </a:rPr>
-              <a:t>png</a:t>
-            </a:r>
-            <a:r>
-              <a:rPr kumimoji="0" lang="de-DE" altLang="de-DE" sz="1800" b="0" i="0" u="none" strike="noStrike" cap="none" normalizeH="0" baseline="0" dirty="0">
-                <a:ln>
-                  <a:noFill/>
-                </a:ln>
-                <a:solidFill>
-                  <a:srgbClr val="6A8759"/>
-                </a:solidFill>
-                <a:effectLst/>
-                <a:latin typeface="Consolas" panose="020B0609020204030204" pitchFamily="49" charset="0"/>
-              </a:rPr>
-              <a:t>"</a:t>
-            </a:r>
-            <a:r>
-              <a:rPr kumimoji="0" lang="de-DE" altLang="de-DE" sz="1800" b="0" i="0" u="none" strike="noStrike" cap="none" normalizeH="0" baseline="0" dirty="0">
-                <a:ln>
-                  <a:noFill/>
-                </a:ln>
-                <a:solidFill>
-                  <a:srgbClr val="CC7E47"/>
-                </a:solidFill>
-                <a:effectLst/>
-                <a:latin typeface="Consolas" panose="020B0609020204030204" pitchFamily="49" charset="0"/>
-              </a:rPr>
-              <a:t>;</a:t>
-            </a:r>
-            <a:br>
-              <a:rPr kumimoji="0" lang="de-DE" altLang="de-DE" sz="1800" b="0" i="0" u="none" strike="noStrike" cap="none" normalizeH="0" baseline="0" dirty="0">
-                <a:ln>
-                  <a:noFill/>
-                </a:ln>
-                <a:solidFill>
-                  <a:srgbClr val="CC7E47"/>
-                </a:solidFill>
-                <a:effectLst/>
-                <a:latin typeface="Consolas" panose="020B0609020204030204" pitchFamily="49" charset="0"/>
-              </a:rPr>
-            </a:br>
-            <a:r>
-              <a:rPr kumimoji="0" lang="de-DE" altLang="de-DE" sz="1800" b="0" i="0" u="none" strike="noStrike" cap="none" normalizeH="0" baseline="0" dirty="0">
-                <a:ln>
-                  <a:noFill/>
-                </a:ln>
-                <a:solidFill>
-                  <a:srgbClr val="CC7E47"/>
-                </a:solidFill>
-                <a:effectLst/>
-                <a:latin typeface="Consolas" panose="020B0609020204030204" pitchFamily="49" charset="0"/>
-              </a:rPr>
-              <a:t>    </a:t>
-            </a:r>
-            <a:r>
-              <a:rPr kumimoji="0" lang="de-DE" altLang="de-DE" sz="1800" b="0" i="0" u="none" strike="noStrike" cap="none" normalizeH="0" baseline="0" dirty="0">
-                <a:ln>
-                  <a:noFill/>
-                </a:ln>
-                <a:solidFill>
-                  <a:srgbClr val="507874"/>
-                </a:solidFill>
-                <a:effectLst/>
-                <a:latin typeface="Consolas" panose="020B0609020204030204" pitchFamily="49" charset="0"/>
-              </a:rPr>
-              <a:t>}</a:t>
-            </a:r>
-            <a:br>
-              <a:rPr kumimoji="0" lang="de-DE" altLang="de-DE" sz="1800" b="0" i="0" u="none" strike="noStrike" cap="none" normalizeH="0" baseline="0" dirty="0">
-                <a:ln>
-                  <a:noFill/>
-                </a:ln>
-                <a:solidFill>
-                  <a:srgbClr val="507874"/>
-                </a:solidFill>
-                <a:effectLst/>
-                <a:latin typeface="Consolas" panose="020B0609020204030204" pitchFamily="49" charset="0"/>
-              </a:rPr>
-            </a:br>
-            <a:br>
-              <a:rPr kumimoji="0" lang="de-DE" altLang="de-DE" sz="1800" b="0" i="0" u="none" strike="noStrike" cap="none" normalizeH="0" baseline="0" dirty="0">
-                <a:ln>
-                  <a:noFill/>
-                </a:ln>
-                <a:solidFill>
-                  <a:srgbClr val="507874"/>
-                </a:solidFill>
-                <a:effectLst/>
-                <a:latin typeface="Consolas" panose="020B0609020204030204" pitchFamily="49" charset="0"/>
-              </a:rPr>
-            </a:br>
-            <a:r>
-              <a:rPr kumimoji="0" lang="de-DE" altLang="de-DE" sz="1800" b="0" i="0" u="none" strike="noStrike" cap="none" normalizeH="0" baseline="0" dirty="0">
-                <a:ln>
-                  <a:noFill/>
-                </a:ln>
-                <a:solidFill>
-                  <a:srgbClr val="507874"/>
-                </a:solidFill>
-                <a:effectLst/>
-                <a:latin typeface="Consolas" panose="020B0609020204030204" pitchFamily="49" charset="0"/>
-              </a:rPr>
-              <a:t>    </a:t>
-            </a:r>
-            <a:r>
-              <a:rPr kumimoji="0" lang="de-DE" altLang="de-DE" sz="1800" b="0" i="0" u="none" strike="noStrike" cap="none" normalizeH="0" baseline="0" dirty="0">
-                <a:ln>
-                  <a:noFill/>
-                </a:ln>
-                <a:solidFill>
                   <a:srgbClr val="7030A0"/>
                 </a:solidFill>
                 <a:effectLst/>
                 <a:latin typeface="Consolas" panose="020B0609020204030204" pitchFamily="49" charset="0"/>
               </a:rPr>
-              <a:t>??? (</a:t>
-            </a:r>
-            <a:r>
-              <a:rPr kumimoji="0" lang="de-DE" altLang="de-DE" sz="1800" b="0" i="0" u="none" strike="noStrike" cap="none" normalizeH="0" baseline="0" dirty="0" err="1">
-                <a:ln>
-                  <a:noFill/>
-                </a:ln>
-                <a:solidFill>
-                  <a:srgbClr val="7030A0"/>
-                </a:solidFill>
-                <a:effectLst/>
-                <a:latin typeface="Consolas" panose="020B0609020204030204" pitchFamily="49" charset="0"/>
-              </a:rPr>
-              <a:t>getter</a:t>
-            </a:r>
-            <a:r>
-              <a:rPr kumimoji="0" lang="de-DE" altLang="de-DE" sz="1800" b="0" i="0" u="none" strike="noStrike" cap="none" normalizeH="0" baseline="0" dirty="0">
-                <a:ln>
-                  <a:noFill/>
-                </a:ln>
-                <a:solidFill>
-                  <a:srgbClr val="7030A0"/>
-                </a:solidFill>
-                <a:effectLst/>
-                <a:latin typeface="Consolas" panose="020B0609020204030204" pitchFamily="49" charset="0"/>
-              </a:rPr>
-              <a:t> für </a:t>
+              <a:t>, </a:t>
             </a:r>
             <a:r>
               <a:rPr kumimoji="0" lang="de-DE" altLang="de-DE" sz="1800" b="0" i="0" u="none" strike="noStrike" cap="none" normalizeH="0" baseline="0" dirty="0" err="1">

</xml_diff>